<commit_message>
Add order control buttons
</commit_message>
<xml_diff>
--- a/Docs/Сайт.pptx
+++ b/Docs/Сайт.pptx
@@ -7044,8 +7044,9 @@
             <a:r>
               <a:rPr lang="ru-RU" sz="4400" dirty="0">
                 <a:effectLst/>
-                <a:latin typeface="Source Code Pro Semibold" panose="020B0609030403020204" pitchFamily="49" charset="0"/>
-                <a:ea typeface="Source Code Pro Semibold" panose="020B0609030403020204" pitchFamily="49" charset="0"/>
+                <a:latin typeface="SF Pro Text" pitchFamily="2" charset="0"/>
+                <a:ea typeface="SF Pro Text" pitchFamily="2" charset="0"/>
+                <a:cs typeface="SF Pro Text" pitchFamily="2" charset="0"/>
               </a:rPr>
               <a:t>Онлайн-продажа билетов</a:t>
             </a:r>
@@ -7053,9 +7054,9 @@
               <a:solidFill>
                 <a:srgbClr val="002060"/>
               </a:solidFill>
-              <a:latin typeface="Source Code Pro Semibold" panose="020B0609030403020204" pitchFamily="49" charset="0"/>
-              <a:ea typeface="Source Code Pro Semibold" panose="020B0609030403020204" pitchFamily="49" charset="0"/>
-              <a:cs typeface="Segoe UI" panose="020B0502040204020203" pitchFamily="34" charset="0"/>
+              <a:latin typeface="SF Pro Text" pitchFamily="2" charset="0"/>
+              <a:ea typeface="SF Pro Text" pitchFamily="2" charset="0"/>
+              <a:cs typeface="SF Pro Text" pitchFamily="2" charset="0"/>
             </a:endParaRPr>
           </a:p>
         </p:txBody>
@@ -11376,10 +11377,21 @@
                 <a:solidFill>
                   <a:srgbClr val="002060"/>
                 </a:solidFill>
+                <a:latin typeface="SF Pro Text" pitchFamily="2" charset="0"/>
+                <a:ea typeface="SF Pro Text" pitchFamily="2" charset="0"/>
+                <a:cs typeface="SF Pro Text" pitchFamily="2" charset="0"/>
+              </a:rPr>
+              <a:t>ОПИСАНИЕ</a:t>
+            </a:r>
+            <a:r>
+              <a:rPr lang="ru-RU" sz="3200" b="1" dirty="0">
+                <a:solidFill>
+                  <a:srgbClr val="002060"/>
+                </a:solidFill>
                 <a:latin typeface="Segoe UI" panose="020B0502040204020203" pitchFamily="34" charset="0"/>
                 <a:cs typeface="Segoe UI" panose="020B0502040204020203" pitchFamily="34" charset="0"/>
               </a:rPr>
-              <a:t>ОПИСАНИЕ ПРОЕКТА</a:t>
+              <a:t> ПРОЕКТА</a:t>
             </a:r>
           </a:p>
         </p:txBody>
@@ -11513,23 +11525,36 @@
               <a:p>
                 <a:pPr rtl="0"/>
                 <a:r>
-                  <a:rPr lang="ru-RU" sz="1600" dirty="0"/>
+                  <a:rPr lang="ru-RU" sz="1600" dirty="0">
+                    <a:latin typeface="SF Pro Text" pitchFamily="2" charset="0"/>
+                    <a:ea typeface="SF Pro Text" pitchFamily="2" charset="0"/>
+                    <a:cs typeface="SF Pro Text" pitchFamily="2" charset="0"/>
+                  </a:rPr>
                   <a:t>«Билеты» — веб-приложение с открытым исходным кодом, основанное на </a:t>
                 </a:r>
                 <a:r>
-                  <a:rPr lang="ru-RU" sz="1600" dirty="0" err="1"/>
+                  <a:rPr lang="ru-RU" sz="1600" dirty="0" err="1">
+                    <a:latin typeface="SF Pro Text" pitchFamily="2" charset="0"/>
+                    <a:ea typeface="SF Pro Text" pitchFamily="2" charset="0"/>
+                    <a:cs typeface="SF Pro Text" pitchFamily="2" charset="0"/>
+                  </a:rPr>
                   <a:t>Flask</a:t>
                 </a:r>
                 <a:r>
-                  <a:rPr lang="ru-RU" sz="1600" dirty="0"/>
+                  <a:rPr lang="ru-RU" sz="1600" dirty="0">
+                    <a:latin typeface="SF Pro Text" pitchFamily="2" charset="0"/>
+                    <a:ea typeface="SF Pro Text" pitchFamily="2" charset="0"/>
+                    <a:cs typeface="SF Pro Text" pitchFamily="2" charset="0"/>
+                  </a:rPr>
                   <a:t>.</a:t>
                 </a:r>
                 <a:endParaRPr lang="ru-RU" sz="1600" dirty="0">
                   <a:solidFill>
                     <a:srgbClr val="002060"/>
                   </a:solidFill>
-                  <a:latin typeface="+mj-lt"/>
-                  <a:cs typeface="Segoe UI" panose="020B0502040204020203" pitchFamily="34" charset="0"/>
+                  <a:latin typeface="SF Pro Text" pitchFamily="2" charset="0"/>
+                  <a:ea typeface="SF Pro Text" pitchFamily="2" charset="0"/>
+                  <a:cs typeface="SF Pro Text" pitchFamily="2" charset="0"/>
                 </a:endParaRPr>
               </a:p>
             </p:txBody>
@@ -11642,10 +11667,41 @@
                 <a:pPr rtl="0"/>
                 <a:r>
                   <a:rPr lang="ru-RU" sz="1600" i="1" dirty="0">
+                    <a:latin typeface="SF Pro Text" pitchFamily="2" charset="0"/>
+                    <a:ea typeface="SF Pro Text" pitchFamily="2" charset="0"/>
+                    <a:cs typeface="SF Pro Text" pitchFamily="2" charset="0"/>
+                  </a:rPr>
+                  <a:t>Шаблон</a:t>
+                </a:r>
+                <a:r>
+                  <a:rPr lang="ru-RU" sz="1600" i="1" dirty="0">
                     <a:latin typeface="+mj-lt"/>
                     <a:cs typeface="Segoe UI" panose="020B0502040204020203" pitchFamily="34" charset="0"/>
                   </a:rPr>
-                  <a:t>Шаблон для онлайн-продажи</a:t>
+                  <a:t> </a:t>
+                </a:r>
+                <a:r>
+                  <a:rPr lang="ru-RU" sz="1600" i="1" dirty="0">
+                    <a:latin typeface="SF Pro Text" pitchFamily="2" charset="0"/>
+                    <a:ea typeface="SF Pro Text" pitchFamily="2" charset="0"/>
+                    <a:cs typeface="SF Pro Text" pitchFamily="2" charset="0"/>
+                  </a:rPr>
+                  <a:t>для</a:t>
+                </a:r>
+                <a:r>
+                  <a:rPr lang="ru-RU" sz="1600" i="1" dirty="0">
+                    <a:latin typeface="+mj-lt"/>
+                    <a:cs typeface="Segoe UI" panose="020B0502040204020203" pitchFamily="34" charset="0"/>
+                  </a:rPr>
+                  <a:t> </a:t>
+                </a:r>
+                <a:r>
+                  <a:rPr lang="ru-RU" sz="1600" i="1" dirty="0">
+                    <a:latin typeface="SF Pro Text" pitchFamily="2" charset="0"/>
+                    <a:ea typeface="SF Pro Text" pitchFamily="2" charset="0"/>
+                    <a:cs typeface="SF Pro Text" pitchFamily="2" charset="0"/>
+                  </a:rPr>
+                  <a:t>онлайн-продажи</a:t>
                 </a:r>
               </a:p>
             </p:txBody>
@@ -11877,8 +11933,9 @@
                     <a:solidFill>
                       <a:srgbClr val="002060"/>
                     </a:solidFill>
-                    <a:latin typeface="+mj-lt"/>
-                    <a:cs typeface="Segoe UI" panose="020B0502040204020203" pitchFamily="34" charset="0"/>
+                    <a:latin typeface="SF Pro Text" pitchFamily="2" charset="0"/>
+                    <a:ea typeface="SF Pro Text" pitchFamily="2" charset="0"/>
+                    <a:cs typeface="SF Pro Text" pitchFamily="2" charset="0"/>
                   </a:rPr>
                   <a:t>Lorem</a:t>
                 </a:r>
@@ -11887,8 +11944,9 @@
                     <a:solidFill>
                       <a:srgbClr val="002060"/>
                     </a:solidFill>
-                    <a:latin typeface="+mj-lt"/>
-                    <a:cs typeface="Segoe UI" panose="020B0502040204020203" pitchFamily="34" charset="0"/>
+                    <a:latin typeface="SF Pro Text" pitchFamily="2" charset="0"/>
+                    <a:ea typeface="SF Pro Text" pitchFamily="2" charset="0"/>
+                    <a:cs typeface="SF Pro Text" pitchFamily="2" charset="0"/>
                   </a:rPr>
                   <a:t> </a:t>
                 </a:r>
@@ -11897,8 +11955,9 @@
                     <a:solidFill>
                       <a:srgbClr val="002060"/>
                     </a:solidFill>
-                    <a:latin typeface="+mj-lt"/>
-                    <a:cs typeface="Segoe UI" panose="020B0502040204020203" pitchFamily="34" charset="0"/>
+                    <a:latin typeface="SF Pro Text" pitchFamily="2" charset="0"/>
+                    <a:ea typeface="SF Pro Text" pitchFamily="2" charset="0"/>
+                    <a:cs typeface="SF Pro Text" pitchFamily="2" charset="0"/>
                   </a:rPr>
                   <a:t>ipsum</a:t>
                 </a:r>
@@ -11907,8 +11966,9 @@
                     <a:solidFill>
                       <a:srgbClr val="002060"/>
                     </a:solidFill>
-                    <a:latin typeface="+mj-lt"/>
-                    <a:cs typeface="Segoe UI" panose="020B0502040204020203" pitchFamily="34" charset="0"/>
+                    <a:latin typeface="SF Pro Text" pitchFamily="2" charset="0"/>
+                    <a:ea typeface="SF Pro Text" pitchFamily="2" charset="0"/>
+                    <a:cs typeface="SF Pro Text" pitchFamily="2" charset="0"/>
                   </a:rPr>
                   <a:t> </a:t>
                 </a:r>
@@ -11917,8 +11977,9 @@
                     <a:solidFill>
                       <a:srgbClr val="002060"/>
                     </a:solidFill>
-                    <a:latin typeface="+mj-lt"/>
-                    <a:cs typeface="Segoe UI" panose="020B0502040204020203" pitchFamily="34" charset="0"/>
+                    <a:latin typeface="SF Pro Text" pitchFamily="2" charset="0"/>
+                    <a:ea typeface="SF Pro Text" pitchFamily="2" charset="0"/>
+                    <a:cs typeface="SF Pro Text" pitchFamily="2" charset="0"/>
                   </a:rPr>
                   <a:t>dolor</a:t>
                 </a:r>
@@ -11927,8 +11988,9 @@
                     <a:solidFill>
                       <a:srgbClr val="002060"/>
                     </a:solidFill>
-                    <a:latin typeface="+mj-lt"/>
-                    <a:cs typeface="Segoe UI" panose="020B0502040204020203" pitchFamily="34" charset="0"/>
+                    <a:latin typeface="SF Pro Text" pitchFamily="2" charset="0"/>
+                    <a:ea typeface="SF Pro Text" pitchFamily="2" charset="0"/>
+                    <a:cs typeface="SF Pro Text" pitchFamily="2" charset="0"/>
                   </a:rPr>
                   <a:t> </a:t>
                 </a:r>
@@ -11937,8 +11999,9 @@
                     <a:solidFill>
                       <a:srgbClr val="002060"/>
                     </a:solidFill>
-                    <a:latin typeface="+mj-lt"/>
-                    <a:cs typeface="Segoe UI" panose="020B0502040204020203" pitchFamily="34" charset="0"/>
+                    <a:latin typeface="SF Pro Text" pitchFamily="2" charset="0"/>
+                    <a:ea typeface="SF Pro Text" pitchFamily="2" charset="0"/>
+                    <a:cs typeface="SF Pro Text" pitchFamily="2" charset="0"/>
                   </a:rPr>
                   <a:t>sit</a:t>
                 </a:r>
@@ -11947,8 +12010,9 @@
                     <a:solidFill>
                       <a:srgbClr val="002060"/>
                     </a:solidFill>
-                    <a:latin typeface="+mj-lt"/>
-                    <a:cs typeface="Segoe UI" panose="020B0502040204020203" pitchFamily="34" charset="0"/>
+                    <a:latin typeface="SF Pro Text" pitchFamily="2" charset="0"/>
+                    <a:ea typeface="SF Pro Text" pitchFamily="2" charset="0"/>
+                    <a:cs typeface="SF Pro Text" pitchFamily="2" charset="0"/>
                   </a:rPr>
                   <a:t> </a:t>
                 </a:r>
@@ -11957,8 +12021,9 @@
                     <a:solidFill>
                       <a:srgbClr val="002060"/>
                     </a:solidFill>
-                    <a:latin typeface="+mj-lt"/>
-                    <a:cs typeface="Segoe UI" panose="020B0502040204020203" pitchFamily="34" charset="0"/>
+                    <a:latin typeface="SF Pro Text" pitchFamily="2" charset="0"/>
+                    <a:ea typeface="SF Pro Text" pitchFamily="2" charset="0"/>
+                    <a:cs typeface="SF Pro Text" pitchFamily="2" charset="0"/>
                   </a:rPr>
                   <a:t>amet</a:t>
                 </a:r>
@@ -11967,8 +12032,9 @@
                     <a:solidFill>
                       <a:srgbClr val="002060"/>
                     </a:solidFill>
-                    <a:latin typeface="+mj-lt"/>
-                    <a:cs typeface="Segoe UI" panose="020B0502040204020203" pitchFamily="34" charset="0"/>
+                    <a:latin typeface="SF Pro Text" pitchFamily="2" charset="0"/>
+                    <a:ea typeface="SF Pro Text" pitchFamily="2" charset="0"/>
+                    <a:cs typeface="SF Pro Text" pitchFamily="2" charset="0"/>
                   </a:rPr>
                   <a:t>, </a:t>
                 </a:r>
@@ -11977,8 +12043,9 @@
                     <a:solidFill>
                       <a:srgbClr val="002060"/>
                     </a:solidFill>
-                    <a:latin typeface="+mj-lt"/>
-                    <a:cs typeface="Segoe UI" panose="020B0502040204020203" pitchFamily="34" charset="0"/>
+                    <a:latin typeface="SF Pro Text" pitchFamily="2" charset="0"/>
+                    <a:ea typeface="SF Pro Text" pitchFamily="2" charset="0"/>
+                    <a:cs typeface="SF Pro Text" pitchFamily="2" charset="0"/>
                   </a:rPr>
                   <a:t>consectetur</a:t>
                 </a:r>
@@ -11987,8 +12054,9 @@
                     <a:solidFill>
                       <a:srgbClr val="002060"/>
                     </a:solidFill>
-                    <a:latin typeface="+mj-lt"/>
-                    <a:cs typeface="Segoe UI" panose="020B0502040204020203" pitchFamily="34" charset="0"/>
+                    <a:latin typeface="SF Pro Text" pitchFamily="2" charset="0"/>
+                    <a:ea typeface="SF Pro Text" pitchFamily="2" charset="0"/>
+                    <a:cs typeface="SF Pro Text" pitchFamily="2" charset="0"/>
                   </a:rPr>
                   <a:t> </a:t>
                 </a:r>
@@ -11997,8 +12065,9 @@
                     <a:solidFill>
                       <a:srgbClr val="002060"/>
                     </a:solidFill>
-                    <a:latin typeface="+mj-lt"/>
-                    <a:cs typeface="Segoe UI" panose="020B0502040204020203" pitchFamily="34" charset="0"/>
+                    <a:latin typeface="SF Pro Text" pitchFamily="2" charset="0"/>
+                    <a:ea typeface="SF Pro Text" pitchFamily="2" charset="0"/>
+                    <a:cs typeface="SF Pro Text" pitchFamily="2" charset="0"/>
                   </a:rPr>
                   <a:t>adipiscing</a:t>
                 </a:r>
@@ -12007,8 +12076,9 @@
                     <a:solidFill>
                       <a:srgbClr val="002060"/>
                     </a:solidFill>
-                    <a:latin typeface="+mj-lt"/>
-                    <a:cs typeface="Segoe UI" panose="020B0502040204020203" pitchFamily="34" charset="0"/>
+                    <a:latin typeface="SF Pro Text" pitchFamily="2" charset="0"/>
+                    <a:ea typeface="SF Pro Text" pitchFamily="2" charset="0"/>
+                    <a:cs typeface="SF Pro Text" pitchFamily="2" charset="0"/>
                   </a:rPr>
                   <a:t> </a:t>
                 </a:r>
@@ -12017,8 +12087,9 @@
                     <a:solidFill>
                       <a:srgbClr val="002060"/>
                     </a:solidFill>
-                    <a:latin typeface="+mj-lt"/>
-                    <a:cs typeface="Segoe UI" panose="020B0502040204020203" pitchFamily="34" charset="0"/>
+                    <a:latin typeface="SF Pro Text" pitchFamily="2" charset="0"/>
+                    <a:ea typeface="SF Pro Text" pitchFamily="2" charset="0"/>
+                    <a:cs typeface="SF Pro Text" pitchFamily="2" charset="0"/>
                   </a:rPr>
                   <a:t>elit</a:t>
                 </a:r>
@@ -12027,8 +12098,9 @@
                     <a:solidFill>
                       <a:srgbClr val="002060"/>
                     </a:solidFill>
-                    <a:latin typeface="+mj-lt"/>
-                    <a:cs typeface="Segoe UI" panose="020B0502040204020203" pitchFamily="34" charset="0"/>
+                    <a:latin typeface="SF Pro Text" pitchFamily="2" charset="0"/>
+                    <a:ea typeface="SF Pro Text" pitchFamily="2" charset="0"/>
+                    <a:cs typeface="SF Pro Text" pitchFamily="2" charset="0"/>
                   </a:rPr>
                   <a:t>. </a:t>
                 </a:r>
@@ -12335,13 +12407,13 @@
         </p:nvPicPr>
         <p:blipFill rotWithShape="1">
           <a:blip r:embed="rId3"/>
-          <a:srcRect r="16807"/>
+          <a:srcRect l="-1056" r="-2042"/>
           <a:stretch/>
         </p:blipFill>
         <p:spPr>
           <a:xfrm>
-            <a:off x="422787" y="1382812"/>
-            <a:ext cx="5542936" cy="5223085"/>
+            <a:off x="74355" y="2160748"/>
+            <a:ext cx="6743701" cy="4023664"/>
           </a:xfrm>
           <a:prstGeom prst="rect">
             <a:avLst/>
@@ -12699,10 +12771,21 @@
                   <a:solidFill>
                     <a:srgbClr val="002060"/>
                   </a:solidFill>
+                  <a:latin typeface="SF Pro Text" pitchFamily="2" charset="0"/>
+                  <a:ea typeface="SF Pro Text" pitchFamily="2" charset="0"/>
+                  <a:cs typeface="SF Pro Text" pitchFamily="2" charset="0"/>
+                </a:rPr>
+                <a:t>СТРУКТУРА</a:t>
+              </a:r>
+              <a:r>
+                <a:rPr lang="ru-RU" sz="2800" b="1" dirty="0">
+                  <a:solidFill>
+                    <a:srgbClr val="002060"/>
+                  </a:solidFill>
                   <a:latin typeface="Segoe UI" panose="020B0502040204020203" pitchFamily="34" charset="0"/>
                   <a:cs typeface="Segoe UI" panose="020B0502040204020203" pitchFamily="34" charset="0"/>
                 </a:rPr>
-                <a:t>СТРУКТУРА САЙТА</a:t>
+                <a:t> САЙТА</a:t>
               </a:r>
             </a:p>
           </p:txBody>
@@ -13025,9 +13108,9 @@
         <p:grpSpPr>
           <a:xfrm>
             <a:off x="1255836" y="3110292"/>
-            <a:ext cx="1824734" cy="1052001"/>
+            <a:ext cx="1913308" cy="1052001"/>
             <a:chOff x="1779726" y="1823735"/>
-            <a:chExt cx="1824734" cy="1052001"/>
+            <a:chExt cx="1913308" cy="1052001"/>
           </a:xfrm>
         </p:grpSpPr>
         <p:sp>
@@ -13064,8 +13147,9 @@
                   <a:solidFill>
                     <a:srgbClr val="002060"/>
                   </a:solidFill>
-                  <a:latin typeface="Segoe UI" panose="020B0502040204020203" pitchFamily="34" charset="0"/>
-                  <a:cs typeface="Segoe UI" panose="020B0502040204020203" pitchFamily="34" charset="0"/>
+                  <a:latin typeface="SF Pro Text" pitchFamily="2" charset="0"/>
+                  <a:ea typeface="SF Pro Text" pitchFamily="2" charset="0"/>
+                  <a:cs typeface="SF Pro Text" pitchFamily="2" charset="0"/>
                 </a:rPr>
                 <a:t>мероприятия</a:t>
               </a:r>
@@ -13087,7 +13171,7 @@
           <p:spPr>
             <a:xfrm>
               <a:off x="2051408" y="2137072"/>
-              <a:ext cx="1553052" cy="738664"/>
+              <a:ext cx="1641626" cy="738664"/>
             </a:xfrm>
             <a:prstGeom prst="rect">
               <a:avLst/>
@@ -13108,8 +13192,9 @@
                   <a:solidFill>
                     <a:srgbClr val="002060"/>
                   </a:solidFill>
-                  <a:latin typeface="+mj-lt"/>
-                  <a:cs typeface="Segoe UI" panose="020B0502040204020203" pitchFamily="34" charset="0"/>
+                  <a:latin typeface="SF Pro Text" pitchFamily="2" charset="0"/>
+                  <a:ea typeface="SF Pro Text" pitchFamily="2" charset="0"/>
+                  <a:cs typeface="SF Pro Text" pitchFamily="2" charset="0"/>
                 </a:rPr>
                 <a:t>событие</a:t>
               </a:r>
@@ -13124,8 +13209,9 @@
                   <a:solidFill>
                     <a:srgbClr val="002060"/>
                   </a:solidFill>
-                  <a:latin typeface="+mj-lt"/>
-                  <a:cs typeface="Segoe UI" panose="020B0502040204020203" pitchFamily="34" charset="0"/>
+                  <a:latin typeface="SF Pro Text" pitchFamily="2" charset="0"/>
+                  <a:ea typeface="SF Pro Text" pitchFamily="2" charset="0"/>
+                  <a:cs typeface="SF Pro Text" pitchFamily="2" charset="0"/>
                 </a:rPr>
                 <a:t>информация</a:t>
               </a:r>
@@ -13139,8 +13225,9 @@
                 <a:solidFill>
                   <a:srgbClr val="002060"/>
                 </a:solidFill>
-                <a:latin typeface="+mj-lt"/>
-                <a:cs typeface="Segoe UI" panose="020B0502040204020203" pitchFamily="34" charset="0"/>
+                <a:latin typeface="SF Pro Text" pitchFamily="2" charset="0"/>
+                <a:ea typeface="SF Pro Text" pitchFamily="2" charset="0"/>
+                <a:cs typeface="SF Pro Text" pitchFamily="2" charset="0"/>
               </a:endParaRPr>
             </a:p>
           </p:txBody>
@@ -16114,8 +16201,8 @@
           </p:nvSpPr>
           <p:spPr>
             <a:xfrm>
-              <a:off x="16573157" y="779004"/>
-              <a:ext cx="1729395" cy="492443"/>
+              <a:off x="16573156" y="779004"/>
+              <a:ext cx="1729396" cy="492443"/>
             </a:xfrm>
             <a:prstGeom prst="rect">
               <a:avLst/>
@@ -16134,8 +16221,9 @@
                   <a:solidFill>
                     <a:srgbClr val="002060"/>
                   </a:solidFill>
-                  <a:latin typeface="Segoe UI" panose="020B0502040204020203" pitchFamily="34" charset="0"/>
-                  <a:cs typeface="Segoe UI" panose="020B0502040204020203" pitchFamily="34" charset="0"/>
+                  <a:latin typeface="SF Pro Text" pitchFamily="2" charset="0"/>
+                  <a:ea typeface="SF Pro Text" pitchFamily="2" charset="0"/>
+                  <a:cs typeface="SF Pro Text" pitchFamily="2" charset="0"/>
                 </a:rPr>
                 <a:t>добавленные билеты</a:t>
               </a:r>
@@ -16175,8 +16263,9 @@
                   <a:solidFill>
                     <a:srgbClr val="002060"/>
                   </a:solidFill>
-                  <a:latin typeface="+mj-lt"/>
-                  <a:cs typeface="Segoe UI" panose="020B0502040204020203" pitchFamily="34" charset="0"/>
+                  <a:latin typeface="SF Pro Text" pitchFamily="2" charset="0"/>
+                  <a:ea typeface="SF Pro Text" pitchFamily="2" charset="0"/>
+                  <a:cs typeface="SF Pro Text" pitchFamily="2" charset="0"/>
                 </a:rPr>
                 <a:t>ЧТО_ТО</a:t>
               </a:r>
@@ -19949,10 +20038,21 @@
                 <a:solidFill>
                   <a:srgbClr val="002060"/>
                 </a:solidFill>
+                <a:latin typeface="SF Pro Text" pitchFamily="2" charset="0"/>
+                <a:ea typeface="SF Pro Text" pitchFamily="2" charset="0"/>
+                <a:cs typeface="SF Pro Text" pitchFamily="2" charset="0"/>
+              </a:rPr>
+              <a:t>ПОЛЬЗОВАТЕЛЬ</a:t>
+            </a:r>
+            <a:r>
+              <a:rPr lang="ru-RU" sz="2400" b="1" dirty="0">
+                <a:solidFill>
+                  <a:srgbClr val="002060"/>
+                </a:solidFill>
                 <a:latin typeface="Segoe UI" panose="020B0502040204020203" pitchFamily="34" charset="0"/>
                 <a:cs typeface="Segoe UI" panose="020B0502040204020203" pitchFamily="34" charset="0"/>
               </a:rPr>
-              <a:t>ПОЛЬЗОВАТЕЛЬ </a:t>
+              <a:t> </a:t>
             </a:r>
             <a:endParaRPr lang="ru-RU" sz="2400" dirty="0">
               <a:solidFill>
@@ -19996,12 +20096,17 @@
                 <a:solidFill>
                   <a:srgbClr val="002060"/>
                 </a:solidFill>
-                <a:latin typeface="Segoe UI" panose="020B0502040204020203" pitchFamily="34" charset="0"/>
-                <a:cs typeface="Segoe UI" panose="020B0502040204020203" pitchFamily="34" charset="0"/>
+                <a:latin typeface="SF Pro Text" pitchFamily="2" charset="0"/>
+                <a:ea typeface="SF Pro Text" pitchFamily="2" charset="0"/>
+                <a:cs typeface="SF Pro Text" pitchFamily="2" charset="0"/>
               </a:rPr>
               <a:t>профиль</a:t>
             </a:r>
-            <a:endParaRPr lang="ru-RU" b="1" dirty="0"/>
+            <a:endParaRPr lang="ru-RU" b="1" dirty="0">
+              <a:latin typeface="SF Pro Text" pitchFamily="2" charset="0"/>
+              <a:ea typeface="SF Pro Text" pitchFamily="2" charset="0"/>
+              <a:cs typeface="SF Pro Text" pitchFamily="2" charset="0"/>
+            </a:endParaRPr>
           </a:p>
         </p:txBody>
       </p:sp>
@@ -20020,7 +20125,7 @@
         <p:spPr>
           <a:xfrm>
             <a:off x="5223368" y="1453190"/>
-            <a:ext cx="2546104" cy="738664"/>
+            <a:ext cx="2546104" cy="984885"/>
           </a:xfrm>
           <a:prstGeom prst="rect">
             <a:avLst/>
@@ -20041,8 +20146,9 @@
                 <a:solidFill>
                   <a:srgbClr val="002060"/>
                 </a:solidFill>
-                <a:latin typeface="+mj-lt"/>
-                <a:cs typeface="Segoe UI" panose="020B0502040204020203" pitchFamily="34" charset="0"/>
+                <a:latin typeface="SF Pro Text" pitchFamily="2" charset="0"/>
+                <a:ea typeface="SF Pro Text" pitchFamily="2" charset="0"/>
+                <a:cs typeface="SF Pro Text" pitchFamily="2" charset="0"/>
               </a:rPr>
               <a:t>данные пользователя</a:t>
             </a:r>
@@ -20057,8 +20163,9 @@
                 <a:solidFill>
                   <a:srgbClr val="002060"/>
                 </a:solidFill>
-                <a:latin typeface="+mj-lt"/>
-                <a:cs typeface="Segoe UI" panose="020B0502040204020203" pitchFamily="34" charset="0"/>
+                <a:latin typeface="SF Pro Text" pitchFamily="2" charset="0"/>
+                <a:ea typeface="SF Pro Text" pitchFamily="2" charset="0"/>
+                <a:cs typeface="SF Pro Text" pitchFamily="2" charset="0"/>
               </a:rPr>
               <a:t>изменение информации</a:t>
             </a:r>
@@ -20072,8 +20179,9 @@
               <a:solidFill>
                 <a:srgbClr val="002060"/>
               </a:solidFill>
-              <a:latin typeface="+mj-lt"/>
-              <a:cs typeface="Segoe UI" panose="020B0502040204020203" pitchFamily="34" charset="0"/>
+              <a:latin typeface="SF Pro Text" pitchFamily="2" charset="0"/>
+              <a:ea typeface="SF Pro Text" pitchFamily="2" charset="0"/>
+              <a:cs typeface="SF Pro Text" pitchFamily="2" charset="0"/>
             </a:endParaRPr>
           </a:p>
         </p:txBody>
@@ -20397,7 +20505,11 @@
           <a:p>
             <a:pPr algn="ctr"/>
             <a:r>
-              <a:rPr lang="ru-RU" dirty="0"/>
+              <a:rPr lang="ru-RU" b="1" dirty="0">
+                <a:latin typeface="SF Pro Text" pitchFamily="2" charset="0"/>
+                <a:ea typeface="SF Pro Text" pitchFamily="2" charset="0"/>
+                <a:cs typeface="SF Pro Text" pitchFamily="2" charset="0"/>
+              </a:rPr>
               <a:t>СООБЩЕНИЯ ОБ ОШИБКАХ</a:t>
             </a:r>
           </a:p>
@@ -20419,14 +20531,13 @@
         </p:nvPicPr>
         <p:blipFill>
           <a:blip r:embed="rId2"/>
-          <a:stretch>
-            <a:fillRect/>
-          </a:stretch>
+          <a:srcRect/>
+          <a:stretch/>
         </p:blipFill>
         <p:spPr>
           <a:xfrm>
-            <a:off x="235974" y="2124383"/>
-            <a:ext cx="6833419" cy="1905864"/>
+            <a:off x="25433" y="2353782"/>
+            <a:ext cx="6989321" cy="1714713"/>
           </a:xfrm>
           <a:prstGeom prst="rect">
             <a:avLst/>
@@ -20459,8 +20570,8 @@
         </p:blipFill>
         <p:spPr>
           <a:xfrm>
-            <a:off x="7344697" y="4491389"/>
-            <a:ext cx="4424516" cy="2001486"/>
+            <a:off x="7344697" y="4030247"/>
+            <a:ext cx="4424516" cy="2462628"/>
           </a:xfrm>
           <a:prstGeom prst="rect">
             <a:avLst/>
@@ -23130,8 +23241,9 @@
                 <a:solidFill>
                   <a:srgbClr val="002060"/>
                 </a:solidFill>
-                <a:latin typeface="Segoe UI" panose="020B0502040204020203" pitchFamily="34" charset="0"/>
-                <a:cs typeface="Segoe UI" panose="020B0502040204020203" pitchFamily="34" charset="0"/>
+                <a:latin typeface="SF Pro Text" pitchFamily="2" charset="0"/>
+                <a:ea typeface="SF Pro Text" pitchFamily="2" charset="0"/>
+                <a:cs typeface="SF Pro Text" pitchFamily="2" charset="0"/>
               </a:rPr>
               <a:t>Спасибо за внимание</a:t>
             </a:r>
@@ -23168,7 +23280,9 @@
             <a:pPr algn="ctr" rtl="0"/>
             <a:r>
               <a:rPr lang="ru-RU" sz="1600" dirty="0">
-                <a:latin typeface="+mj-lt"/>
+                <a:latin typeface="SF Pro Text" pitchFamily="2" charset="0"/>
+                <a:ea typeface="SF Pro Text" pitchFamily="2" charset="0"/>
+                <a:cs typeface="SF Pro Text" pitchFamily="2" charset="0"/>
               </a:rPr>
               <a:t>Лицей Академии Яндекса</a:t>
             </a:r>
@@ -23180,8 +23294,9 @@
                 <a:solidFill>
                   <a:srgbClr val="002060"/>
                 </a:solidFill>
-                <a:latin typeface="+mj-lt"/>
-                <a:cs typeface="Segoe UI" panose="020B0502040204020203" pitchFamily="34" charset="0"/>
+                <a:latin typeface="SF Pro Text" pitchFamily="2" charset="0"/>
+                <a:ea typeface="SF Pro Text" pitchFamily="2" charset="0"/>
+                <a:cs typeface="SF Pro Text" pitchFamily="2" charset="0"/>
               </a:rPr>
               <a:t>2022г.</a:t>
             </a:r>
@@ -24087,6 +24202,15 @@
 </file>
 
 <file path=customXml/item1.xml><?xml version="1.0" encoding="utf-8"?>
+<?mso-contentType ?>
+<FormTemplates xmlns="http://schemas.microsoft.com/sharepoint/v3/contenttype/forms">
+  <Display>DocumentLibraryForm</Display>
+  <Edit>DocumentLibraryForm</Edit>
+  <New>DocumentLibraryForm</New>
+</FormTemplates>
+</file>
+
+<file path=customXml/item2.xml><?xml version="1.0" encoding="utf-8"?>
 <p:properties xmlns:p="http://schemas.microsoft.com/office/2006/metadata/properties" xmlns:xsi="http://www.w3.org/2001/XMLSchema-instance" xmlns:pc="http://schemas.microsoft.com/office/infopath/2007/PartnerControls">
   <documentManagement>
     <_ip_UnifiedCompliancePolicyUIAction xmlns="http://schemas.microsoft.com/sharepoint/v3" xsi:nil="true"/>
@@ -24104,15 +24228,6 @@
     <MediaServiceKeyPoints xmlns="71af3243-3dd4-4a8d-8c0d-dd76da1f02a5" xsi:nil="true"/>
   </documentManagement>
 </p:properties>
-</file>
-
-<file path=customXml/item2.xml><?xml version="1.0" encoding="utf-8"?>
-<?mso-contentType ?>
-<FormTemplates xmlns="http://schemas.microsoft.com/sharepoint/v3/contenttype/forms">
-  <Display>DocumentLibraryForm</Display>
-  <Edit>DocumentLibraryForm</Edit>
-  <New>DocumentLibraryForm</New>
-</FormTemplates>
 </file>
 
 <file path=customXml/item3.xml><?xml version="1.0" encoding="utf-8"?>
@@ -24404,6 +24519,14 @@
 </file>
 
 <file path=customXml/itemProps1.xml><?xml version="1.0" encoding="utf-8"?>
+<ds:datastoreItem xmlns:ds="http://schemas.openxmlformats.org/officeDocument/2006/customXml" ds:itemID="{3516AB37-D7B9-4507-B21E-5D459905C6C0}">
+  <ds:schemaRefs>
+    <ds:schemaRef ds:uri="http://schemas.microsoft.com/sharepoint/v3/contenttype/forms"/>
+  </ds:schemaRefs>
+</ds:datastoreItem>
+</file>
+
+<file path=customXml/itemProps2.xml><?xml version="1.0" encoding="utf-8"?>
 <ds:datastoreItem xmlns:ds="http://schemas.openxmlformats.org/officeDocument/2006/customXml" ds:itemID="{FE40622C-5D03-4258-98D9-CB4F18C7FADE}">
   <ds:schemaRefs>
     <ds:schemaRef ds:uri="http://schemas.microsoft.com/office/2006/metadata/properties"/>
@@ -24411,14 +24534,6 @@
     <ds:schemaRef ds:uri="http://schemas.microsoft.com/sharepoint/v3"/>
     <ds:schemaRef ds:uri="71af3243-3dd4-4a8d-8c0d-dd76da1f02a5"/>
     <ds:schemaRef ds:uri="230e9df3-be65-4c73-a93b-d1236ebd677e"/>
-  </ds:schemaRefs>
-</ds:datastoreItem>
-</file>
-
-<file path=customXml/itemProps2.xml><?xml version="1.0" encoding="utf-8"?>
-<ds:datastoreItem xmlns:ds="http://schemas.openxmlformats.org/officeDocument/2006/customXml" ds:itemID="{3516AB37-D7B9-4507-B21E-5D459905C6C0}">
-  <ds:schemaRefs>
-    <ds:schemaRef ds:uri="http://schemas.microsoft.com/sharepoint/v3/contenttype/forms"/>
   </ds:schemaRefs>
 </ds:datastoreItem>
 </file>

</xml_diff>